<commit_message>
UPDATED-> modificados enpoints de home para los banners
</commit_message>
<xml_diff>
--- a/docs/home.pptx
+++ b/docs/home.pptx
@@ -197,7 +197,7 @@
           <a:p>
             <a:fld id="{28C7DD2D-EC57-A84E-B3EE-16F932E51D89}" type="datetimeFigureOut">
               <a:rPr lang="es-MX" smtClean="0"/>
-              <a:t>14/09/20</a:t>
+              <a:t>12/10/20</a:t>
             </a:fld>
             <a:endParaRPr lang="es-MX"/>
           </a:p>
@@ -698,7 +698,7 @@
           <a:p>
             <a:fld id="{68BF357F-16BC-764D-A1B0-E74A75D8A5FF}" type="datetimeFigureOut">
               <a:rPr lang="es-MX" smtClean="0"/>
-              <a:t>14/09/20</a:t>
+              <a:t>12/10/20</a:t>
             </a:fld>
             <a:endParaRPr lang="es-MX"/>
           </a:p>
@@ -898,7 +898,7 @@
           <a:p>
             <a:fld id="{68BF357F-16BC-764D-A1B0-E74A75D8A5FF}" type="datetimeFigureOut">
               <a:rPr lang="es-MX" smtClean="0"/>
-              <a:t>14/09/20</a:t>
+              <a:t>12/10/20</a:t>
             </a:fld>
             <a:endParaRPr lang="es-MX"/>
           </a:p>
@@ -1108,7 +1108,7 @@
           <a:p>
             <a:fld id="{68BF357F-16BC-764D-A1B0-E74A75D8A5FF}" type="datetimeFigureOut">
               <a:rPr lang="es-MX" smtClean="0"/>
-              <a:t>14/09/20</a:t>
+              <a:t>12/10/20</a:t>
             </a:fld>
             <a:endParaRPr lang="es-MX"/>
           </a:p>
@@ -1308,7 +1308,7 @@
           <a:p>
             <a:fld id="{68BF357F-16BC-764D-A1B0-E74A75D8A5FF}" type="datetimeFigureOut">
               <a:rPr lang="es-MX" smtClean="0"/>
-              <a:t>14/09/20</a:t>
+              <a:t>12/10/20</a:t>
             </a:fld>
             <a:endParaRPr lang="es-MX"/>
           </a:p>
@@ -1584,7 +1584,7 @@
           <a:p>
             <a:fld id="{68BF357F-16BC-764D-A1B0-E74A75D8A5FF}" type="datetimeFigureOut">
               <a:rPr lang="es-MX" smtClean="0"/>
-              <a:t>14/09/20</a:t>
+              <a:t>12/10/20</a:t>
             </a:fld>
             <a:endParaRPr lang="es-MX"/>
           </a:p>
@@ -1852,7 +1852,7 @@
           <a:p>
             <a:fld id="{68BF357F-16BC-764D-A1B0-E74A75D8A5FF}" type="datetimeFigureOut">
               <a:rPr lang="es-MX" smtClean="0"/>
-              <a:t>14/09/20</a:t>
+              <a:t>12/10/20</a:t>
             </a:fld>
             <a:endParaRPr lang="es-MX"/>
           </a:p>
@@ -2267,7 +2267,7 @@
           <a:p>
             <a:fld id="{68BF357F-16BC-764D-A1B0-E74A75D8A5FF}" type="datetimeFigureOut">
               <a:rPr lang="es-MX" smtClean="0"/>
-              <a:t>14/09/20</a:t>
+              <a:t>12/10/20</a:t>
             </a:fld>
             <a:endParaRPr lang="es-MX"/>
           </a:p>
@@ -2409,7 +2409,7 @@
           <a:p>
             <a:fld id="{68BF357F-16BC-764D-A1B0-E74A75D8A5FF}" type="datetimeFigureOut">
               <a:rPr lang="es-MX" smtClean="0"/>
-              <a:t>14/09/20</a:t>
+              <a:t>12/10/20</a:t>
             </a:fld>
             <a:endParaRPr lang="es-MX"/>
           </a:p>
@@ -2522,7 +2522,7 @@
           <a:p>
             <a:fld id="{68BF357F-16BC-764D-A1B0-E74A75D8A5FF}" type="datetimeFigureOut">
               <a:rPr lang="es-MX" smtClean="0"/>
-              <a:t>14/09/20</a:t>
+              <a:t>12/10/20</a:t>
             </a:fld>
             <a:endParaRPr lang="es-MX"/>
           </a:p>
@@ -2835,7 +2835,7 @@
           <a:p>
             <a:fld id="{68BF357F-16BC-764D-A1B0-E74A75D8A5FF}" type="datetimeFigureOut">
               <a:rPr lang="es-MX" smtClean="0"/>
-              <a:t>14/09/20</a:t>
+              <a:t>12/10/20</a:t>
             </a:fld>
             <a:endParaRPr lang="es-MX"/>
           </a:p>
@@ -3124,7 +3124,7 @@
           <a:p>
             <a:fld id="{68BF357F-16BC-764D-A1B0-E74A75D8A5FF}" type="datetimeFigureOut">
               <a:rPr lang="es-MX" smtClean="0"/>
-              <a:t>14/09/20</a:t>
+              <a:t>12/10/20</a:t>
             </a:fld>
             <a:endParaRPr lang="es-MX"/>
           </a:p>
@@ -3367,7 +3367,7 @@
           <a:p>
             <a:fld id="{68BF357F-16BC-764D-A1B0-E74A75D8A5FF}" type="datetimeFigureOut">
               <a:rPr lang="es-MX" smtClean="0"/>
-              <a:t>14/09/20</a:t>
+              <a:t>12/10/20</a:t>
             </a:fld>
             <a:endParaRPr lang="es-MX"/>
           </a:p>
@@ -3881,7 +3881,7 @@
         <p:spPr>
           <a:xfrm>
             <a:off x="3000321" y="207056"/>
-            <a:ext cx="809837" cy="400110"/>
+            <a:ext cx="1083951" cy="400110"/>
           </a:xfrm>
           <a:prstGeom prst="rect">
             <a:avLst/>
@@ -3902,7 +3902,7 @@
           <a:p>
             <a:r>
               <a:rPr lang="es-MX" sz="1000" dirty="0"/>
-              <a:t>/home/&lt;id&gt;</a:t>
+              <a:t>/home/principal/</a:t>
             </a:r>
           </a:p>
         </p:txBody>
@@ -4247,7 +4247,7 @@
         <p:spPr>
           <a:xfrm>
             <a:off x="3000320" y="2518604"/>
-            <a:ext cx="809837" cy="400110"/>
+            <a:ext cx="965329" cy="400110"/>
           </a:xfrm>
           <a:prstGeom prst="rect">
             <a:avLst/>
@@ -4268,7 +4268,7 @@
           <a:p>
             <a:r>
               <a:rPr lang="es-MX" sz="1000" dirty="0"/>
-              <a:t>/home/&lt;id&gt;</a:t>
+              <a:t>/home/medio/</a:t>
             </a:r>
           </a:p>
         </p:txBody>
@@ -4288,7 +4288,7 @@
         <p:spPr>
           <a:xfrm>
             <a:off x="3012983" y="3583443"/>
-            <a:ext cx="809837" cy="400110"/>
+            <a:ext cx="795411" cy="400110"/>
           </a:xfrm>
           <a:prstGeom prst="rect">
             <a:avLst/>
@@ -4309,8 +4309,13 @@
           <a:p>
             <a:r>
               <a:rPr lang="es-MX" sz="1000" dirty="0"/>
-              <a:t>/home/&lt;id&gt;</a:t>
-            </a:r>
+              <a:t>/</a:t>
+            </a:r>
+            <a:r>
+              <a:rPr lang="es-MX" sz="1000"/>
+              <a:t>home/pie/</a:t>
+            </a:r>
+            <a:endParaRPr lang="es-MX" sz="1000" dirty="0"/>
           </a:p>
         </p:txBody>
       </p:sp>

</xml_diff>